<commit_message>
Ported the word2vec code Updated presentation
</commit_message>
<xml_diff>
--- a/Applied Data Science.pptx
+++ b/Applied Data Science.pptx
@@ -4,6 +4,9 @@
   <p:sldMasterIdLst>
     <p:sldMasterId id="2147483648" r:id="rId1"/>
   </p:sldMasterIdLst>
+  <p:notesMasterIdLst>
+    <p:notesMasterId r:id="rId37"/>
+  </p:notesMasterIdLst>
   <p:sldIdLst>
     <p:sldId id="256" r:id="rId2"/>
     <p:sldId id="278" r:id="rId3"/>
@@ -18,18 +21,18 @@
     <p:sldId id="264" r:id="rId12"/>
     <p:sldId id="261" r:id="rId13"/>
     <p:sldId id="267" r:id="rId14"/>
-    <p:sldId id="265" r:id="rId15"/>
+    <p:sldId id="274" r:id="rId15"/>
     <p:sldId id="271" r:id="rId16"/>
     <p:sldId id="294" r:id="rId17"/>
-    <p:sldId id="274" r:id="rId18"/>
-    <p:sldId id="295" r:id="rId19"/>
-    <p:sldId id="296" r:id="rId20"/>
-    <p:sldId id="302" r:id="rId21"/>
-    <p:sldId id="275" r:id="rId22"/>
-    <p:sldId id="280" r:id="rId23"/>
-    <p:sldId id="282" r:id="rId24"/>
-    <p:sldId id="297" r:id="rId25"/>
-    <p:sldId id="298" r:id="rId26"/>
+    <p:sldId id="295" r:id="rId18"/>
+    <p:sldId id="296" r:id="rId19"/>
+    <p:sldId id="302" r:id="rId20"/>
+    <p:sldId id="282" r:id="rId21"/>
+    <p:sldId id="297" r:id="rId22"/>
+    <p:sldId id="298" r:id="rId23"/>
+    <p:sldId id="275" r:id="rId24"/>
+    <p:sldId id="280" r:id="rId25"/>
+    <p:sldId id="303" r:id="rId26"/>
     <p:sldId id="281" r:id="rId27"/>
     <p:sldId id="299" r:id="rId28"/>
     <p:sldId id="283" r:id="rId29"/>
@@ -141,6 +144,440 @@
 </p:presentation>
 </file>
 
+<file path=ppt/notesMasters/notesMaster1.xml><?xml version="1.0" encoding="utf-8"?>
+<p:notesMaster xmlns:a="http://schemas.openxmlformats.org/drawingml/2006/main" xmlns:r="http://schemas.openxmlformats.org/officeDocument/2006/relationships" xmlns:p="http://schemas.openxmlformats.org/presentationml/2006/main">
+  <p:cSld>
+    <p:bg>
+      <p:bgRef idx="1001">
+        <a:schemeClr val="bg1"/>
+      </p:bgRef>
+    </p:bg>
+    <p:spTree>
+      <p:nvGrpSpPr>
+        <p:cNvPr id="1" name=""/>
+        <p:cNvGrpSpPr/>
+        <p:nvPr/>
+      </p:nvGrpSpPr>
+      <p:grpSpPr>
+        <a:xfrm>
+          <a:off x="0" y="0"/>
+          <a:ext cx="0" cy="0"/>
+          <a:chOff x="0" y="0"/>
+          <a:chExt cx="0" cy="0"/>
+        </a:xfrm>
+      </p:grpSpPr>
+      <p:sp>
+        <p:nvSpPr>
+          <p:cNvPr id="2" name="Header Placeholder 1"/>
+          <p:cNvSpPr>
+            <a:spLocks noGrp="1"/>
+          </p:cNvSpPr>
+          <p:nvPr>
+            <p:ph type="hdr" sz="quarter"/>
+          </p:nvPr>
+        </p:nvSpPr>
+        <p:spPr>
+          <a:xfrm>
+            <a:off x="0" y="0"/>
+            <a:ext cx="2971800" cy="457200"/>
+          </a:xfrm>
+          <a:prstGeom prst="rect">
+            <a:avLst/>
+          </a:prstGeom>
+        </p:spPr>
+        <p:txBody>
+          <a:bodyPr vert="horz" lIns="91440" tIns="45720" rIns="91440" bIns="45720" rtlCol="0"/>
+          <a:lstStyle>
+            <a:lvl1pPr algn="l">
+              <a:defRPr sz="1200"/>
+            </a:lvl1pPr>
+          </a:lstStyle>
+          <a:p>
+            <a:endParaRPr lang="en-US"/>
+          </a:p>
+        </p:txBody>
+      </p:sp>
+      <p:sp>
+        <p:nvSpPr>
+          <p:cNvPr id="3" name="Date Placeholder 2"/>
+          <p:cNvSpPr>
+            <a:spLocks noGrp="1"/>
+          </p:cNvSpPr>
+          <p:nvPr>
+            <p:ph type="dt" idx="1"/>
+          </p:nvPr>
+        </p:nvSpPr>
+        <p:spPr>
+          <a:xfrm>
+            <a:off x="3884613" y="0"/>
+            <a:ext cx="2971800" cy="457200"/>
+          </a:xfrm>
+          <a:prstGeom prst="rect">
+            <a:avLst/>
+          </a:prstGeom>
+        </p:spPr>
+        <p:txBody>
+          <a:bodyPr vert="horz" lIns="91440" tIns="45720" rIns="91440" bIns="45720" rtlCol="0"/>
+          <a:lstStyle>
+            <a:lvl1pPr algn="r">
+              <a:defRPr sz="1200"/>
+            </a:lvl1pPr>
+          </a:lstStyle>
+          <a:p>
+            <a:fld id="{373F3CC4-90C0-224B-8BEA-5451D8C040BB}" type="datetimeFigureOut">
+              <a:rPr lang="en-US" smtClean="0"/>
+              <a:t>1/02/16</a:t>
+            </a:fld>
+            <a:endParaRPr lang="en-US"/>
+          </a:p>
+        </p:txBody>
+      </p:sp>
+      <p:sp>
+        <p:nvSpPr>
+          <p:cNvPr id="4" name="Slide Image Placeholder 3"/>
+          <p:cNvSpPr>
+            <a:spLocks noGrp="1" noRot="1" noChangeAspect="1"/>
+          </p:cNvSpPr>
+          <p:nvPr>
+            <p:ph type="sldImg" idx="2"/>
+          </p:nvPr>
+        </p:nvSpPr>
+        <p:spPr>
+          <a:xfrm>
+            <a:off x="1143000" y="685800"/>
+            <a:ext cx="4572000" cy="3429000"/>
+          </a:xfrm>
+          <a:prstGeom prst="rect">
+            <a:avLst/>
+          </a:prstGeom>
+          <a:noFill/>
+          <a:ln w="12700">
+            <a:solidFill>
+              <a:prstClr val="black"/>
+            </a:solidFill>
+          </a:ln>
+        </p:spPr>
+        <p:txBody>
+          <a:bodyPr vert="horz" lIns="91440" tIns="45720" rIns="91440" bIns="45720" rtlCol="0" anchor="ctr"/>
+          <a:lstStyle/>
+          <a:p>
+            <a:endParaRPr lang="en-US"/>
+          </a:p>
+        </p:txBody>
+      </p:sp>
+      <p:sp>
+        <p:nvSpPr>
+          <p:cNvPr id="5" name="Notes Placeholder 4"/>
+          <p:cNvSpPr>
+            <a:spLocks noGrp="1"/>
+          </p:cNvSpPr>
+          <p:nvPr>
+            <p:ph type="body" sz="quarter" idx="3"/>
+          </p:nvPr>
+        </p:nvSpPr>
+        <p:spPr>
+          <a:xfrm>
+            <a:off x="685800" y="4343400"/>
+            <a:ext cx="5486400" cy="4114800"/>
+          </a:xfrm>
+          <a:prstGeom prst="rect">
+            <a:avLst/>
+          </a:prstGeom>
+        </p:spPr>
+        <p:txBody>
+          <a:bodyPr vert="horz" lIns="91440" tIns="45720" rIns="91440" bIns="45720" rtlCol="0"/>
+          <a:lstStyle/>
+          <a:p>
+            <a:pPr lvl="0"/>
+            <a:r>
+              <a:rPr lang="en-US" smtClean="0"/>
+              <a:t>Click to edit Master text styles</a:t>
+            </a:r>
+          </a:p>
+          <a:p>
+            <a:pPr lvl="1"/>
+            <a:r>
+              <a:rPr lang="en-US" smtClean="0"/>
+              <a:t>Second level</a:t>
+            </a:r>
+          </a:p>
+          <a:p>
+            <a:pPr lvl="2"/>
+            <a:r>
+              <a:rPr lang="en-US" smtClean="0"/>
+              <a:t>Third level</a:t>
+            </a:r>
+          </a:p>
+          <a:p>
+            <a:pPr lvl="3"/>
+            <a:r>
+              <a:rPr lang="en-US" smtClean="0"/>
+              <a:t>Fourth level</a:t>
+            </a:r>
+          </a:p>
+          <a:p>
+            <a:pPr lvl="4"/>
+            <a:r>
+              <a:rPr lang="en-US" smtClean="0"/>
+              <a:t>Fifth level</a:t>
+            </a:r>
+            <a:endParaRPr lang="en-US"/>
+          </a:p>
+        </p:txBody>
+      </p:sp>
+      <p:sp>
+        <p:nvSpPr>
+          <p:cNvPr id="6" name="Footer Placeholder 5"/>
+          <p:cNvSpPr>
+            <a:spLocks noGrp="1"/>
+          </p:cNvSpPr>
+          <p:nvPr>
+            <p:ph type="ftr" sz="quarter" idx="4"/>
+          </p:nvPr>
+        </p:nvSpPr>
+        <p:spPr>
+          <a:xfrm>
+            <a:off x="0" y="8685213"/>
+            <a:ext cx="2971800" cy="457200"/>
+          </a:xfrm>
+          <a:prstGeom prst="rect">
+            <a:avLst/>
+          </a:prstGeom>
+        </p:spPr>
+        <p:txBody>
+          <a:bodyPr vert="horz" lIns="91440" tIns="45720" rIns="91440" bIns="45720" rtlCol="0" anchor="b"/>
+          <a:lstStyle>
+            <a:lvl1pPr algn="l">
+              <a:defRPr sz="1200"/>
+            </a:lvl1pPr>
+          </a:lstStyle>
+          <a:p>
+            <a:endParaRPr lang="en-US"/>
+          </a:p>
+        </p:txBody>
+      </p:sp>
+      <p:sp>
+        <p:nvSpPr>
+          <p:cNvPr id="7" name="Slide Number Placeholder 6"/>
+          <p:cNvSpPr>
+            <a:spLocks noGrp="1"/>
+          </p:cNvSpPr>
+          <p:nvPr>
+            <p:ph type="sldNum" sz="quarter" idx="5"/>
+          </p:nvPr>
+        </p:nvSpPr>
+        <p:spPr>
+          <a:xfrm>
+            <a:off x="3884613" y="8685213"/>
+            <a:ext cx="2971800" cy="457200"/>
+          </a:xfrm>
+          <a:prstGeom prst="rect">
+            <a:avLst/>
+          </a:prstGeom>
+        </p:spPr>
+        <p:txBody>
+          <a:bodyPr vert="horz" lIns="91440" tIns="45720" rIns="91440" bIns="45720" rtlCol="0" anchor="b"/>
+          <a:lstStyle>
+            <a:lvl1pPr algn="r">
+              <a:defRPr sz="1200"/>
+            </a:lvl1pPr>
+          </a:lstStyle>
+          <a:p>
+            <a:fld id="{DF088828-DADB-654D-A202-36B8BE9CE2EB}" type="slidenum">
+              <a:rPr lang="en-US" smtClean="0"/>
+              <a:t>‹#›</a:t>
+            </a:fld>
+            <a:endParaRPr lang="en-US"/>
+          </a:p>
+        </p:txBody>
+      </p:sp>
+    </p:spTree>
+    <p:extLst>
+      <p:ext uri="{BB962C8B-B14F-4D97-AF65-F5344CB8AC3E}">
+        <p14:creationId xmlns:p14="http://schemas.microsoft.com/office/powerpoint/2010/main" val="3595999746"/>
+      </p:ext>
+    </p:extLst>
+  </p:cSld>
+  <p:clrMap bg1="lt1" tx1="dk1" bg2="lt2" tx2="dk2" accent1="accent1" accent2="accent2" accent3="accent3" accent4="accent4" accent5="accent5" accent6="accent6" hlink="hlink" folHlink="folHlink"/>
+  <p:notesStyle>
+    <a:lvl1pPr marL="0" algn="l" defTabSz="457200" rtl="0" eaLnBrk="1" latinLnBrk="0" hangingPunct="1">
+      <a:defRPr sz="1200" kern="1200">
+        <a:solidFill>
+          <a:schemeClr val="tx1"/>
+        </a:solidFill>
+        <a:latin typeface="+mn-lt"/>
+        <a:ea typeface="+mn-ea"/>
+        <a:cs typeface="+mn-cs"/>
+      </a:defRPr>
+    </a:lvl1pPr>
+    <a:lvl2pPr marL="457200" algn="l" defTabSz="457200" rtl="0" eaLnBrk="1" latinLnBrk="0" hangingPunct="1">
+      <a:defRPr sz="1200" kern="1200">
+        <a:solidFill>
+          <a:schemeClr val="tx1"/>
+        </a:solidFill>
+        <a:latin typeface="+mn-lt"/>
+        <a:ea typeface="+mn-ea"/>
+        <a:cs typeface="+mn-cs"/>
+      </a:defRPr>
+    </a:lvl2pPr>
+    <a:lvl3pPr marL="914400" algn="l" defTabSz="457200" rtl="0" eaLnBrk="1" latinLnBrk="0" hangingPunct="1">
+      <a:defRPr sz="1200" kern="1200">
+        <a:solidFill>
+          <a:schemeClr val="tx1"/>
+        </a:solidFill>
+        <a:latin typeface="+mn-lt"/>
+        <a:ea typeface="+mn-ea"/>
+        <a:cs typeface="+mn-cs"/>
+      </a:defRPr>
+    </a:lvl3pPr>
+    <a:lvl4pPr marL="1371600" algn="l" defTabSz="457200" rtl="0" eaLnBrk="1" latinLnBrk="0" hangingPunct="1">
+      <a:defRPr sz="1200" kern="1200">
+        <a:solidFill>
+          <a:schemeClr val="tx1"/>
+        </a:solidFill>
+        <a:latin typeface="+mn-lt"/>
+        <a:ea typeface="+mn-ea"/>
+        <a:cs typeface="+mn-cs"/>
+      </a:defRPr>
+    </a:lvl4pPr>
+    <a:lvl5pPr marL="1828800" algn="l" defTabSz="457200" rtl="0" eaLnBrk="1" latinLnBrk="0" hangingPunct="1">
+      <a:defRPr sz="1200" kern="1200">
+        <a:solidFill>
+          <a:schemeClr val="tx1"/>
+        </a:solidFill>
+        <a:latin typeface="+mn-lt"/>
+        <a:ea typeface="+mn-ea"/>
+        <a:cs typeface="+mn-cs"/>
+      </a:defRPr>
+    </a:lvl5pPr>
+    <a:lvl6pPr marL="2286000" algn="l" defTabSz="457200" rtl="0" eaLnBrk="1" latinLnBrk="0" hangingPunct="1">
+      <a:defRPr sz="1200" kern="1200">
+        <a:solidFill>
+          <a:schemeClr val="tx1"/>
+        </a:solidFill>
+        <a:latin typeface="+mn-lt"/>
+        <a:ea typeface="+mn-ea"/>
+        <a:cs typeface="+mn-cs"/>
+      </a:defRPr>
+    </a:lvl6pPr>
+    <a:lvl7pPr marL="2743200" algn="l" defTabSz="457200" rtl="0" eaLnBrk="1" latinLnBrk="0" hangingPunct="1">
+      <a:defRPr sz="1200" kern="1200">
+        <a:solidFill>
+          <a:schemeClr val="tx1"/>
+        </a:solidFill>
+        <a:latin typeface="+mn-lt"/>
+        <a:ea typeface="+mn-ea"/>
+        <a:cs typeface="+mn-cs"/>
+      </a:defRPr>
+    </a:lvl7pPr>
+    <a:lvl8pPr marL="3200400" algn="l" defTabSz="457200" rtl="0" eaLnBrk="1" latinLnBrk="0" hangingPunct="1">
+      <a:defRPr sz="1200" kern="1200">
+        <a:solidFill>
+          <a:schemeClr val="tx1"/>
+        </a:solidFill>
+        <a:latin typeface="+mn-lt"/>
+        <a:ea typeface="+mn-ea"/>
+        <a:cs typeface="+mn-cs"/>
+      </a:defRPr>
+    </a:lvl8pPr>
+    <a:lvl9pPr marL="3657600" algn="l" defTabSz="457200" rtl="0" eaLnBrk="1" latinLnBrk="0" hangingPunct="1">
+      <a:defRPr sz="1200" kern="1200">
+        <a:solidFill>
+          <a:schemeClr val="tx1"/>
+        </a:solidFill>
+        <a:latin typeface="+mn-lt"/>
+        <a:ea typeface="+mn-ea"/>
+        <a:cs typeface="+mn-cs"/>
+      </a:defRPr>
+    </a:lvl9pPr>
+  </p:notesStyle>
+</p:notesMaster>
+</file>
+
+<file path=ppt/notesSlides/notesSlide1.xml><?xml version="1.0" encoding="utf-8"?>
+<p:notes xmlns:a="http://schemas.openxmlformats.org/drawingml/2006/main" xmlns:r="http://schemas.openxmlformats.org/officeDocument/2006/relationships" xmlns:p="http://schemas.openxmlformats.org/presentationml/2006/main">
+  <p:cSld>
+    <p:spTree>
+      <p:nvGrpSpPr>
+        <p:cNvPr id="1" name=""/>
+        <p:cNvGrpSpPr/>
+        <p:nvPr/>
+      </p:nvGrpSpPr>
+      <p:grpSpPr>
+        <a:xfrm>
+          <a:off x="0" y="0"/>
+          <a:ext cx="0" cy="0"/>
+          <a:chOff x="0" y="0"/>
+          <a:chExt cx="0" cy="0"/>
+        </a:xfrm>
+      </p:grpSpPr>
+      <p:sp>
+        <p:nvSpPr>
+          <p:cNvPr id="2" name="Slide Image Placeholder 1"/>
+          <p:cNvSpPr>
+            <a:spLocks noGrp="1" noRot="1" noChangeAspect="1"/>
+          </p:cNvSpPr>
+          <p:nvPr>
+            <p:ph type="sldImg"/>
+          </p:nvPr>
+        </p:nvSpPr>
+        <p:spPr/>
+      </p:sp>
+      <p:sp>
+        <p:nvSpPr>
+          <p:cNvPr id="3" name="Notes Placeholder 2"/>
+          <p:cNvSpPr>
+            <a:spLocks noGrp="1"/>
+          </p:cNvSpPr>
+          <p:nvPr>
+            <p:ph type="body" idx="1"/>
+          </p:nvPr>
+        </p:nvSpPr>
+        <p:spPr/>
+        <p:txBody>
+          <a:bodyPr/>
+          <a:lstStyle/>
+          <a:p>
+            <a:endParaRPr lang="en-US" dirty="0"/>
+          </a:p>
+        </p:txBody>
+      </p:sp>
+      <p:sp>
+        <p:nvSpPr>
+          <p:cNvPr id="4" name="Slide Number Placeholder 3"/>
+          <p:cNvSpPr>
+            <a:spLocks noGrp="1"/>
+          </p:cNvSpPr>
+          <p:nvPr>
+            <p:ph type="sldNum" sz="quarter" idx="10"/>
+          </p:nvPr>
+        </p:nvSpPr>
+        <p:spPr/>
+        <p:txBody>
+          <a:bodyPr/>
+          <a:lstStyle/>
+          <a:p>
+            <a:fld id="{DF088828-DADB-654D-A202-36B8BE9CE2EB}" type="slidenum">
+              <a:rPr lang="en-US" smtClean="0"/>
+              <a:t>16</a:t>
+            </a:fld>
+            <a:endParaRPr lang="en-US"/>
+          </a:p>
+        </p:txBody>
+      </p:sp>
+    </p:spTree>
+    <p:extLst>
+      <p:ext uri="{BB962C8B-B14F-4D97-AF65-F5344CB8AC3E}">
+        <p14:creationId xmlns:p14="http://schemas.microsoft.com/office/powerpoint/2010/main" val="991546540"/>
+      </p:ext>
+    </p:extLst>
+  </p:cSld>
+  <p:clrMapOvr>
+    <a:masterClrMapping/>
+  </p:clrMapOvr>
+</p:notes>
+</file>
+
 <file path=ppt/slideLayouts/slideLayout1.xml><?xml version="1.0" encoding="utf-8"?>
 <p:sldLayout xmlns:a="http://schemas.openxmlformats.org/drawingml/2006/main" xmlns:r="http://schemas.openxmlformats.org/officeDocument/2006/relationships" xmlns:p="http://schemas.openxmlformats.org/presentationml/2006/main" type="title" preserve="1">
   <p:cSld name="Title Slide">
@@ -322,7 +759,7 @@
           <a:p>
             <a:fld id="{3025417E-0620-1548-BE40-D583F79F4C87}" type="datetimeFigureOut">
               <a:rPr lang="en-US" smtClean="0"/>
-              <a:t>23/01/16</a:t>
+              <a:t>1/02/16</a:t>
             </a:fld>
             <a:endParaRPr lang="en-US"/>
           </a:p>
@@ -492,7 +929,7 @@
           <a:p>
             <a:fld id="{3025417E-0620-1548-BE40-D583F79F4C87}" type="datetimeFigureOut">
               <a:rPr lang="en-US" smtClean="0"/>
-              <a:t>23/01/16</a:t>
+              <a:t>1/02/16</a:t>
             </a:fld>
             <a:endParaRPr lang="en-US"/>
           </a:p>
@@ -672,7 +1109,7 @@
           <a:p>
             <a:fld id="{3025417E-0620-1548-BE40-D583F79F4C87}" type="datetimeFigureOut">
               <a:rPr lang="en-US" smtClean="0"/>
-              <a:t>23/01/16</a:t>
+              <a:t>1/02/16</a:t>
             </a:fld>
             <a:endParaRPr lang="en-US"/>
           </a:p>
@@ -842,7 +1279,7 @@
           <a:p>
             <a:fld id="{3025417E-0620-1548-BE40-D583F79F4C87}" type="datetimeFigureOut">
               <a:rPr lang="en-US" smtClean="0"/>
-              <a:t>23/01/16</a:t>
+              <a:t>1/02/16</a:t>
             </a:fld>
             <a:endParaRPr lang="en-US"/>
           </a:p>
@@ -1088,7 +1525,7 @@
           <a:p>
             <a:fld id="{3025417E-0620-1548-BE40-D583F79F4C87}" type="datetimeFigureOut">
               <a:rPr lang="en-US" smtClean="0"/>
-              <a:t>23/01/16</a:t>
+              <a:t>1/02/16</a:t>
             </a:fld>
             <a:endParaRPr lang="en-US"/>
           </a:p>
@@ -1376,7 +1813,7 @@
           <a:p>
             <a:fld id="{3025417E-0620-1548-BE40-D583F79F4C87}" type="datetimeFigureOut">
               <a:rPr lang="en-US" smtClean="0"/>
-              <a:t>23/01/16</a:t>
+              <a:t>1/02/16</a:t>
             </a:fld>
             <a:endParaRPr lang="en-US"/>
           </a:p>
@@ -1798,7 +2235,7 @@
           <a:p>
             <a:fld id="{3025417E-0620-1548-BE40-D583F79F4C87}" type="datetimeFigureOut">
               <a:rPr lang="en-US" smtClean="0"/>
-              <a:t>23/01/16</a:t>
+              <a:t>1/02/16</a:t>
             </a:fld>
             <a:endParaRPr lang="en-US"/>
           </a:p>
@@ -1916,7 +2353,7 @@
           <a:p>
             <a:fld id="{3025417E-0620-1548-BE40-D583F79F4C87}" type="datetimeFigureOut">
               <a:rPr lang="en-US" smtClean="0"/>
-              <a:t>23/01/16</a:t>
+              <a:t>1/02/16</a:t>
             </a:fld>
             <a:endParaRPr lang="en-US"/>
           </a:p>
@@ -2011,7 +2448,7 @@
           <a:p>
             <a:fld id="{3025417E-0620-1548-BE40-D583F79F4C87}" type="datetimeFigureOut">
               <a:rPr lang="en-US" smtClean="0"/>
-              <a:t>23/01/16</a:t>
+              <a:t>1/02/16</a:t>
             </a:fld>
             <a:endParaRPr lang="en-US"/>
           </a:p>
@@ -2288,7 +2725,7 @@
           <a:p>
             <a:fld id="{3025417E-0620-1548-BE40-D583F79F4C87}" type="datetimeFigureOut">
               <a:rPr lang="en-US" smtClean="0"/>
-              <a:t>23/01/16</a:t>
+              <a:t>1/02/16</a:t>
             </a:fld>
             <a:endParaRPr lang="en-US"/>
           </a:p>
@@ -2541,7 +2978,7 @@
           <a:p>
             <a:fld id="{3025417E-0620-1548-BE40-D583F79F4C87}" type="datetimeFigureOut">
               <a:rPr lang="en-US" smtClean="0"/>
-              <a:t>23/01/16</a:t>
+              <a:t>1/02/16</a:t>
             </a:fld>
             <a:endParaRPr lang="en-US"/>
           </a:p>
@@ -2754,7 +3191,7 @@
           <a:p>
             <a:fld id="{3025417E-0620-1548-BE40-D583F79F4C87}" type="datetimeFigureOut">
               <a:rPr lang="en-US" smtClean="0"/>
-              <a:t>23/01/16</a:t>
+              <a:t>1/02/16</a:t>
             </a:fld>
             <a:endParaRPr lang="en-US"/>
           </a:p>
@@ -3388,11 +3825,7 @@
           <a:p>
             <a:r>
               <a:rPr lang="en-US" dirty="0" smtClean="0"/>
-              <a:t>Random forest; gradient boosting; convolutional networks; vector-based conceptual </a:t>
-            </a:r>
-            <a:r>
-              <a:rPr lang="en-US" dirty="0" smtClean="0"/>
-              <a:t>representation; deep learning</a:t>
+              <a:t>Random forest; gradient boosting; convolutional networks; vector-based conceptual representation; deep learning</a:t>
             </a:r>
             <a:endParaRPr lang="en-US" dirty="0"/>
           </a:p>
@@ -3678,11 +4111,7 @@
           <a:p>
             <a:r>
               <a:rPr lang="en-US" dirty="0" smtClean="0"/>
-              <a:t>Neural </a:t>
-            </a:r>
-            <a:r>
-              <a:rPr lang="en-US" dirty="0" smtClean="0"/>
-              <a:t>nets: Convolutional Networks, Recurrent Networks, Deep Networks</a:t>
+              <a:t>Neural nets: Convolutional Networks, Recurrent Networks, Deep Networks</a:t>
             </a:r>
           </a:p>
           <a:p>
@@ -3773,39 +4202,24 @@
         </p:spPr>
         <p:txBody>
           <a:bodyPr>
-            <a:normAutofit fontScale="85000" lnSpcReduction="20000"/>
+            <a:normAutofit/>
           </a:bodyPr>
           <a:lstStyle/>
           <a:p>
             <a:r>
               <a:rPr lang="en-US" dirty="0" smtClean="0"/>
-              <a:t>We are about to cover all of this in the remaining </a:t>
-            </a:r>
-            <a:r>
-              <a:rPr lang="en-US" dirty="0" smtClean="0"/>
-              <a:t>60</a:t>
-            </a:r>
-            <a:r>
-              <a:rPr lang="en-US" dirty="0" smtClean="0"/>
-              <a:t>-odd minutes.</a:t>
-            </a:r>
-          </a:p>
-          <a:p>
-            <a:r>
-              <a:rPr lang="en-US" dirty="0" smtClean="0"/>
-              <a:t>Hopefully, with some time to spare.</a:t>
-            </a:r>
-          </a:p>
-          <a:p>
-            <a:r>
-              <a:rPr lang="en-US" dirty="0" smtClean="0"/>
-              <a:t>If time allows, let’s try to solve something novel in the last twenty minutes.</a:t>
-            </a:r>
-          </a:p>
-          <a:p>
-            <a:r>
-              <a:rPr lang="en-US" dirty="0" smtClean="0"/>
-              <a:t>Divided up into two </a:t>
+              <a:t>Reproducing significant results</a:t>
+            </a:r>
+            <a:endParaRPr lang="en-US" dirty="0"/>
+          </a:p>
+          <a:p>
+            <a:r>
+              <a:rPr lang="en-US" dirty="0" smtClean="0"/>
+              <a:t>Divided </a:t>
+            </a:r>
+            <a:r>
+              <a:rPr lang="en-US" dirty="0" smtClean="0"/>
+              <a:t>up into two </a:t>
             </a:r>
             <a:r>
               <a:rPr lang="en-US" dirty="0" err="1" smtClean="0"/>
@@ -3859,7 +4273,11 @@
             <a:pPr lvl="1"/>
             <a:r>
               <a:rPr lang="en-US" dirty="0" smtClean="0"/>
-              <a:t>BYOD (bring your own data)</a:t>
+              <a:t>If time allows: BYOD </a:t>
+            </a:r>
+            <a:r>
+              <a:rPr lang="en-US" dirty="0" smtClean="0"/>
+              <a:t>(bring your own data)</a:t>
             </a:r>
           </a:p>
         </p:txBody>
@@ -3911,28 +4329,88 @@
             <p:ph type="title"/>
           </p:nvPr>
         </p:nvSpPr>
+        <p:spPr/>
+        <p:txBody>
+          <a:bodyPr/>
+          <a:lstStyle/>
+          <a:p>
+            <a:r>
+              <a:rPr lang="en-US" dirty="0" smtClean="0"/>
+              <a:t>Session One -- Images</a:t>
+            </a:r>
+            <a:endParaRPr lang="en-US" dirty="0"/>
+          </a:p>
+        </p:txBody>
+      </p:sp>
+      <p:pic>
+        <p:nvPicPr>
+          <p:cNvPr id="4" name="Content Placeholder 3"/>
+          <p:cNvPicPr>
+            <a:picLocks noGrp="1" noChangeAspect="1"/>
+          </p:cNvPicPr>
+          <p:nvPr>
+            <p:ph idx="1"/>
+          </p:nvPr>
+        </p:nvPicPr>
+        <p:blipFill>
+          <a:blip r:embed="rId2"/>
+          <a:srcRect l="-40915" r="-40915"/>
+          <a:stretch>
+            <a:fillRect/>
+          </a:stretch>
+        </p:blipFill>
+        <p:spPr/>
+      </p:pic>
+      <p:sp>
+        <p:nvSpPr>
+          <p:cNvPr id="3" name="TextBox 2"/>
+          <p:cNvSpPr txBox="1"/>
+          <p:nvPr/>
+        </p:nvSpPr>
         <p:spPr>
           <a:xfrm>
-            <a:off x="457200" y="2973611"/>
-            <a:ext cx="8229600" cy="1143000"/>
+            <a:off x="1224681" y="6395886"/>
+            <a:ext cx="7098613" cy="307777"/>
           </a:xfrm>
+          <a:prstGeom prst="rect">
+            <a:avLst/>
+          </a:prstGeom>
+          <a:noFill/>
         </p:spPr>
         <p:txBody>
-          <a:bodyPr/>
-          <a:lstStyle/>
-          <a:p>
-            <a:r>
-              <a:rPr lang="en-US" dirty="0" smtClean="0"/>
-              <a:t>Reproducing Significant Results</a:t>
-            </a:r>
-            <a:endParaRPr lang="en-US" dirty="0"/>
+          <a:bodyPr wrap="square" rtlCol="0">
+            <a:spAutoFit/>
+          </a:bodyPr>
+          <a:lstStyle/>
+          <a:p>
+            <a:pPr algn="ctr"/>
+            <a:r>
+              <a:rPr lang="en-US" sz="1400" dirty="0"/>
+              <a:t>Image source: http://</a:t>
+            </a:r>
+            <a:r>
+              <a:rPr lang="en-US" sz="1400" dirty="0" err="1"/>
+              <a:t>www.opendeep.org</a:t>
+            </a:r>
+            <a:r>
+              <a:rPr lang="en-US" sz="1400" dirty="0"/>
+              <a:t>/docs/tutorial-classifying-handwritten-</a:t>
+            </a:r>
+            <a:r>
+              <a:rPr lang="en-US" sz="1400" dirty="0" err="1"/>
+              <a:t>mnist</a:t>
+            </a:r>
+            <a:r>
+              <a:rPr lang="en-US" sz="1400" dirty="0"/>
+              <a:t>-images</a:t>
+            </a:r>
           </a:p>
         </p:txBody>
       </p:sp>
     </p:spTree>
     <p:extLst>
       <p:ext uri="{BB962C8B-B14F-4D97-AF65-F5344CB8AC3E}">
-        <p14:creationId xmlns:p14="http://schemas.microsoft.com/office/powerpoint/2010/main" val="4272653661"/>
+        <p14:creationId xmlns:p14="http://schemas.microsoft.com/office/powerpoint/2010/main" val="1415662161"/>
       </p:ext>
     </p:extLst>
   </p:cSld>
@@ -4020,11 +4498,7 @@
             <a:pPr lvl="1"/>
             <a:r>
               <a:rPr lang="en-US" dirty="0" smtClean="0"/>
-              <a:t>Random </a:t>
-            </a:r>
-            <a:r>
-              <a:rPr lang="en-US" dirty="0" smtClean="0"/>
-              <a:t>Forests: ensembles are good</a:t>
+              <a:t>Random Forests: ensembles are good</a:t>
             </a:r>
           </a:p>
           <a:p>
@@ -4141,7 +4615,7 @@
           </p:nvPr>
         </p:nvPicPr>
         <p:blipFill>
-          <a:blip r:embed="rId2">
+          <a:blip r:embed="rId3">
             <a:extLst>
               <a:ext uri="{28A0092B-C50C-407E-A947-70E740481C1C}">
                 <a14:useLocalDpi xmlns:a14="http://schemas.microsoft.com/office/drawing/2010/main" val="0"/>
@@ -4247,131 +4721,6 @@
           <a:p>
             <a:r>
               <a:rPr lang="en-US" dirty="0" smtClean="0"/>
-              <a:t>Session One -- Images</a:t>
-            </a:r>
-            <a:endParaRPr lang="en-US" dirty="0"/>
-          </a:p>
-        </p:txBody>
-      </p:sp>
-      <p:pic>
-        <p:nvPicPr>
-          <p:cNvPr id="4" name="Content Placeholder 3"/>
-          <p:cNvPicPr>
-            <a:picLocks noGrp="1" noChangeAspect="1"/>
-          </p:cNvPicPr>
-          <p:nvPr>
-            <p:ph idx="1"/>
-          </p:nvPr>
-        </p:nvPicPr>
-        <p:blipFill>
-          <a:blip r:embed="rId2"/>
-          <a:srcRect l="-40915" r="-40915"/>
-          <a:stretch>
-            <a:fillRect/>
-          </a:stretch>
-        </p:blipFill>
-        <p:spPr/>
-      </p:pic>
-      <p:sp>
-        <p:nvSpPr>
-          <p:cNvPr id="3" name="TextBox 2"/>
-          <p:cNvSpPr txBox="1"/>
-          <p:nvPr/>
-        </p:nvSpPr>
-        <p:spPr>
-          <a:xfrm>
-            <a:off x="1224681" y="6395886"/>
-            <a:ext cx="7098613" cy="307777"/>
-          </a:xfrm>
-          <a:prstGeom prst="rect">
-            <a:avLst/>
-          </a:prstGeom>
-          <a:noFill/>
-        </p:spPr>
-        <p:txBody>
-          <a:bodyPr wrap="square" rtlCol="0">
-            <a:spAutoFit/>
-          </a:bodyPr>
-          <a:lstStyle/>
-          <a:p>
-            <a:pPr algn="ctr"/>
-            <a:r>
-              <a:rPr lang="en-US" sz="1400" dirty="0"/>
-              <a:t>Image source: http://</a:t>
-            </a:r>
-            <a:r>
-              <a:rPr lang="en-US" sz="1400" dirty="0" err="1"/>
-              <a:t>www.opendeep.org</a:t>
-            </a:r>
-            <a:r>
-              <a:rPr lang="en-US" sz="1400" dirty="0"/>
-              <a:t>/docs/tutorial-classifying-handwritten-</a:t>
-            </a:r>
-            <a:r>
-              <a:rPr lang="en-US" sz="1400" dirty="0" err="1"/>
-              <a:t>mnist</a:t>
-            </a:r>
-            <a:r>
-              <a:rPr lang="en-US" sz="1400" dirty="0"/>
-              <a:t>-images</a:t>
-            </a:r>
-          </a:p>
-        </p:txBody>
-      </p:sp>
-    </p:spTree>
-    <p:extLst>
-      <p:ext uri="{BB962C8B-B14F-4D97-AF65-F5344CB8AC3E}">
-        <p14:creationId xmlns:p14="http://schemas.microsoft.com/office/powerpoint/2010/main" val="1415662161"/>
-      </p:ext>
-    </p:extLst>
-  </p:cSld>
-  <p:clrMapOvr>
-    <a:masterClrMapping/>
-  </p:clrMapOvr>
-  <p:timing>
-    <p:tnLst>
-      <p:par>
-        <p:cTn xmlns:p14="http://schemas.microsoft.com/office/powerpoint/2010/main" id="1" dur="indefinite" restart="never" nodeType="tmRoot"/>
-      </p:par>
-    </p:tnLst>
-  </p:timing>
-</p:sld>
-</file>
-
-<file path=ppt/slides/slide18.xml><?xml version="1.0" encoding="utf-8"?>
-<p:sld xmlns:a="http://schemas.openxmlformats.org/drawingml/2006/main" xmlns:r="http://schemas.openxmlformats.org/officeDocument/2006/relationships" xmlns:p="http://schemas.openxmlformats.org/presentationml/2006/main">
-  <p:cSld>
-    <p:spTree>
-      <p:nvGrpSpPr>
-        <p:cNvPr id="1" name=""/>
-        <p:cNvGrpSpPr/>
-        <p:nvPr/>
-      </p:nvGrpSpPr>
-      <p:grpSpPr>
-        <a:xfrm>
-          <a:off x="0" y="0"/>
-          <a:ext cx="0" cy="0"/>
-          <a:chOff x="0" y="0"/>
-          <a:chExt cx="0" cy="0"/>
-        </a:xfrm>
-      </p:grpSpPr>
-      <p:sp>
-        <p:nvSpPr>
-          <p:cNvPr id="2" name="Title 1"/>
-          <p:cNvSpPr>
-            <a:spLocks noGrp="1"/>
-          </p:cNvSpPr>
-          <p:nvPr>
-            <p:ph type="title"/>
-          </p:nvPr>
-        </p:nvSpPr>
-        <p:spPr/>
-        <p:txBody>
-          <a:bodyPr/>
-          <a:lstStyle/>
-          <a:p>
-            <a:r>
-              <a:rPr lang="en-US" dirty="0" smtClean="0"/>
               <a:t>Basic Neural Net</a:t>
             </a:r>
             <a:endParaRPr lang="en-US" dirty="0"/>
@@ -4470,7 +4819,7 @@
 </p:sld>
 </file>
 
-<file path=ppt/slides/slide19.xml><?xml version="1.0" encoding="utf-8"?>
+<file path=ppt/slides/slide18.xml><?xml version="1.0" encoding="utf-8"?>
 <p:sld xmlns:a="http://schemas.openxmlformats.org/drawingml/2006/main" xmlns:r="http://schemas.openxmlformats.org/officeDocument/2006/relationships" xmlns:p="http://schemas.openxmlformats.org/presentationml/2006/main">
   <p:cSld>
     <p:spTree>
@@ -4740,6 +5089,102 @@
 </p:sld>
 </file>
 
+<file path=ppt/slides/slide19.xml><?xml version="1.0" encoding="utf-8"?>
+<p:sld xmlns:a="http://schemas.openxmlformats.org/drawingml/2006/main" xmlns:r="http://schemas.openxmlformats.org/officeDocument/2006/relationships" xmlns:p="http://schemas.openxmlformats.org/presentationml/2006/main">
+  <p:cSld>
+    <p:spTree>
+      <p:nvGrpSpPr>
+        <p:cNvPr id="1" name=""/>
+        <p:cNvGrpSpPr/>
+        <p:nvPr/>
+      </p:nvGrpSpPr>
+      <p:grpSpPr>
+        <a:xfrm>
+          <a:off x="0" y="0"/>
+          <a:ext cx="0" cy="0"/>
+          <a:chOff x="0" y="0"/>
+          <a:chExt cx="0" cy="0"/>
+        </a:xfrm>
+      </p:grpSpPr>
+      <p:sp>
+        <p:nvSpPr>
+          <p:cNvPr id="2" name="Title 1"/>
+          <p:cNvSpPr>
+            <a:spLocks noGrp="1"/>
+          </p:cNvSpPr>
+          <p:nvPr>
+            <p:ph type="title"/>
+          </p:nvPr>
+        </p:nvSpPr>
+        <p:spPr/>
+        <p:txBody>
+          <a:bodyPr/>
+          <a:lstStyle/>
+          <a:p>
+            <a:r>
+              <a:rPr lang="en-US" dirty="0" smtClean="0"/>
+              <a:t>Hands-On Examples</a:t>
+            </a:r>
+            <a:endParaRPr lang="en-US" dirty="0"/>
+          </a:p>
+        </p:txBody>
+      </p:sp>
+      <p:sp>
+        <p:nvSpPr>
+          <p:cNvPr id="3" name="Content Placeholder 2"/>
+          <p:cNvSpPr>
+            <a:spLocks noGrp="1"/>
+          </p:cNvSpPr>
+          <p:nvPr>
+            <p:ph idx="1"/>
+          </p:nvPr>
+        </p:nvSpPr>
+        <p:spPr/>
+        <p:txBody>
+          <a:bodyPr/>
+          <a:lstStyle/>
+          <a:p>
+            <a:r>
+              <a:rPr lang="en-US" dirty="0"/>
+              <a:t>s</a:t>
+            </a:r>
+            <a:r>
+              <a:rPr lang="en-US" dirty="0" smtClean="0"/>
+              <a:t>ource  activate &lt;path to environment&gt;</a:t>
+            </a:r>
+          </a:p>
+          <a:p>
+            <a:r>
+              <a:rPr lang="en-US" dirty="0" err="1" smtClean="0"/>
+              <a:t>Ipython</a:t>
+            </a:r>
+            <a:r>
+              <a:rPr lang="en-US" dirty="0" smtClean="0"/>
+              <a:t> notebook</a:t>
+            </a:r>
+          </a:p>
+          <a:p>
+            <a:r>
+              <a:rPr lang="en-US" dirty="0" smtClean="0"/>
+              <a:t>Go look at the MNIST directory</a:t>
+            </a:r>
+            <a:endParaRPr lang="en-US" dirty="0"/>
+          </a:p>
+        </p:txBody>
+      </p:sp>
+    </p:spTree>
+    <p:extLst>
+      <p:ext uri="{BB962C8B-B14F-4D97-AF65-F5344CB8AC3E}">
+        <p14:creationId xmlns:p14="http://schemas.microsoft.com/office/powerpoint/2010/main" val="822081320"/>
+      </p:ext>
+    </p:extLst>
+  </p:cSld>
+  <p:clrMapOvr>
+    <a:masterClrMapping/>
+  </p:clrMapOvr>
+</p:sld>
+</file>
+
 <file path=ppt/slides/slide2.xml><?xml version="1.0" encoding="utf-8"?>
 <p:sld xmlns:a="http://schemas.openxmlformats.org/drawingml/2006/main" xmlns:r="http://schemas.openxmlformats.org/officeDocument/2006/relationships" xmlns:p="http://schemas.openxmlformats.org/presentationml/2006/main">
   <p:cSld>
@@ -4805,7 +5250,13 @@
               <a:rPr lang="en-US" dirty="0" smtClean="0">
                 <a:hlinkClick r:id="rId2"/>
               </a:rPr>
-              <a:t>http://tinyurl.com/oypxd2x</a:t>
+              <a:t>http</a:t>
+            </a:r>
+            <a:r>
+              <a:rPr lang="en-US" dirty="0" smtClean="0">
+                <a:hlinkClick r:id="rId2"/>
+              </a:rPr>
+              <a:t>://tinyurl.com/oypxd2x</a:t>
             </a:r>
             <a:r>
               <a:rPr lang="en-US" dirty="0"/>
@@ -4907,7 +5358,7 @@
           <a:p>
             <a:r>
               <a:rPr lang="en-US" dirty="0" smtClean="0"/>
-              <a:t>Hands-On Examples</a:t>
+              <a:t>Testing Predictions</a:t>
             </a:r>
             <a:endParaRPr lang="en-US" dirty="0"/>
           </a:p>
@@ -4925,12 +5376,74 @@
         </p:nvSpPr>
         <p:spPr/>
         <p:txBody>
-          <a:bodyPr/>
-          <a:lstStyle/>
-          <a:p>
-            <a:r>
-              <a:rPr lang="en-US" dirty="0" smtClean="0"/>
-              <a:t>&gt; cd </a:t>
+          <a:bodyPr>
+            <a:normAutofit lnSpcReduction="10000"/>
+          </a:bodyPr>
+          <a:lstStyle/>
+          <a:p>
+            <a:r>
+              <a:rPr lang="en-US" dirty="0" smtClean="0"/>
+              <a:t>How do you know if you something is right?</a:t>
+            </a:r>
+          </a:p>
+          <a:p>
+            <a:r>
+              <a:rPr lang="en-US" dirty="0" smtClean="0"/>
+              <a:t>Especially if you’re a </a:t>
+            </a:r>
+            <a:r>
+              <a:rPr lang="en-US" dirty="0" err="1" smtClean="0"/>
+              <a:t>sceptical</a:t>
+            </a:r>
+            <a:r>
+              <a:rPr lang="en-US" dirty="0" smtClean="0"/>
+              <a:t> person…</a:t>
+            </a:r>
+          </a:p>
+          <a:p>
+            <a:endParaRPr lang="en-US" dirty="0"/>
+          </a:p>
+          <a:p>
+            <a:r>
+              <a:rPr lang="en-US" dirty="0" smtClean="0"/>
+              <a:t>Worked </a:t>
+            </a:r>
+            <a:r>
+              <a:rPr lang="en-US" dirty="0" smtClean="0"/>
+              <a:t>on my </a:t>
+            </a:r>
+            <a:r>
+              <a:rPr lang="en-US" dirty="0" smtClean="0"/>
+              <a:t>machine</a:t>
+            </a:r>
+          </a:p>
+          <a:p>
+            <a:r>
+              <a:rPr lang="en-US" dirty="0"/>
+              <a:t>“Seems okay</a:t>
+            </a:r>
+            <a:r>
+              <a:rPr lang="en-US" dirty="0" smtClean="0"/>
+              <a:t>”</a:t>
+            </a:r>
+            <a:endParaRPr lang="en-US" dirty="0" smtClean="0"/>
+          </a:p>
+          <a:p>
+            <a:r>
+              <a:rPr lang="en-US" dirty="0" smtClean="0"/>
+              <a:t>About as good as a weather forecast</a:t>
+            </a:r>
+          </a:p>
+          <a:p>
+            <a:r>
+              <a:rPr lang="en-US" dirty="0" smtClean="0"/>
+              <a:t>As good as X within Y% likelihood</a:t>
+            </a:r>
+          </a:p>
+          <a:p>
+            <a:r>
+              <a:rPr lang="en-US" dirty="0" smtClean="0"/>
+              <a:t>Accounts for Z% of the error</a:t>
             </a:r>
             <a:endParaRPr lang="en-US" dirty="0"/>
           </a:p>
@@ -4939,13 +5452,20 @@
     </p:spTree>
     <p:extLst>
       <p:ext uri="{BB962C8B-B14F-4D97-AF65-F5344CB8AC3E}">
-        <p14:creationId xmlns:p14="http://schemas.microsoft.com/office/powerpoint/2010/main" val="822081320"/>
+        <p14:creationId xmlns:p14="http://schemas.microsoft.com/office/powerpoint/2010/main" val="1645523586"/>
       </p:ext>
     </p:extLst>
   </p:cSld>
   <p:clrMapOvr>
     <a:masterClrMapping/>
   </p:clrMapOvr>
+  <p:timing>
+    <p:tnLst>
+      <p:par>
+        <p:cTn xmlns:p14="http://schemas.microsoft.com/office/powerpoint/2010/main" id="1" dur="indefinite" restart="never" nodeType="tmRoot"/>
+      </p:par>
+    </p:tnLst>
+  </p:timing>
 </p:sld>
 </file>
 
@@ -4983,67 +5503,88 @@
           <a:p>
             <a:r>
               <a:rPr lang="en-US" dirty="0" smtClean="0"/>
-              <a:t>Session Two -- Text</a:t>
+              <a:t>Percent Explained (R2)</a:t>
             </a:r>
             <a:endParaRPr lang="en-US" dirty="0"/>
           </a:p>
         </p:txBody>
       </p:sp>
-      <p:sp>
-        <p:nvSpPr>
-          <p:cNvPr id="3" name="Content Placeholder 2"/>
-          <p:cNvSpPr>
-            <a:spLocks noGrp="1"/>
-          </p:cNvSpPr>
-          <p:nvPr>
-            <p:ph idx="1"/>
-          </p:nvPr>
-        </p:nvSpPr>
-        <p:spPr/>
-        <p:txBody>
-          <a:bodyPr/>
-          <a:lstStyle/>
-          <a:p>
-            <a:r>
-              <a:rPr lang="en-US" dirty="0" smtClean="0"/>
-              <a:t>Natural Language Processing</a:t>
-            </a:r>
-          </a:p>
-          <a:p>
-            <a:r>
-              <a:rPr lang="en-US" dirty="0" smtClean="0"/>
-              <a:t>Natural Language Generation</a:t>
-            </a:r>
-          </a:p>
-          <a:p>
-            <a:r>
-              <a:rPr lang="en-US" dirty="0" smtClean="0"/>
-              <a:t>Natural Language Understanding (</a:t>
-            </a:r>
-            <a:r>
-              <a:rPr lang="en-US" dirty="0" err="1" smtClean="0"/>
-              <a:t>ish</a:t>
-            </a:r>
-            <a:r>
-              <a:rPr lang="en-US" dirty="0" smtClean="0"/>
-              <a:t>)</a:t>
-            </a:r>
-          </a:p>
-          <a:p>
-            <a:r>
-              <a:rPr lang="en-US" dirty="0" smtClean="0"/>
-              <a:t>Markov models, word2vec</a:t>
-            </a:r>
-          </a:p>
-          <a:p>
-            <a:endParaRPr lang="en-US" dirty="0"/>
+      <p:pic>
+        <p:nvPicPr>
+          <p:cNvPr id="4" name="Picture 3" descr="r-squared-710x400.png"/>
+          <p:cNvPicPr>
+            <a:picLocks noChangeAspect="1"/>
+          </p:cNvPicPr>
+          <p:nvPr/>
+        </p:nvPicPr>
+        <p:blipFill>
+          <a:blip r:embed="rId2">
+            <a:extLst>
+              <a:ext uri="{28A0092B-C50C-407E-A947-70E740481C1C}">
+                <a14:useLocalDpi xmlns:a14="http://schemas.microsoft.com/office/drawing/2010/main" val="0"/>
+              </a:ext>
+            </a:extLst>
+          </a:blip>
+          <a:stretch>
+            <a:fillRect/>
+          </a:stretch>
+        </p:blipFill>
+        <p:spPr>
+          <a:xfrm>
+            <a:off x="1181100" y="2011630"/>
+            <a:ext cx="6762750" cy="3810000"/>
+          </a:xfrm>
+          <a:prstGeom prst="rect">
+            <a:avLst/>
+          </a:prstGeom>
+        </p:spPr>
+      </p:pic>
+      <p:sp>
+        <p:nvSpPr>
+          <p:cNvPr id="3" name="TextBox 2"/>
+          <p:cNvSpPr txBox="1"/>
+          <p:nvPr/>
+        </p:nvSpPr>
+        <p:spPr>
+          <a:xfrm>
+            <a:off x="1338077" y="6015214"/>
+            <a:ext cx="6735744" cy="369332"/>
+          </a:xfrm>
+          <a:prstGeom prst="rect">
+            <a:avLst/>
+          </a:prstGeom>
+          <a:noFill/>
+        </p:spPr>
+        <p:txBody>
+          <a:bodyPr wrap="square" rtlCol="0">
+            <a:spAutoFit/>
+          </a:bodyPr>
+          <a:lstStyle/>
+          <a:p>
+            <a:pPr algn="ctr"/>
+            <a:r>
+              <a:rPr lang="en-US" dirty="0" smtClean="0"/>
+              <a:t>Source: http</a:t>
+            </a:r>
+            <a:r>
+              <a:rPr lang="en-US" dirty="0"/>
+              <a:t>://</a:t>
+            </a:r>
+            <a:r>
+              <a:rPr lang="en-US" dirty="0" err="1"/>
+              <a:t>www.rapidinsightinc.com</a:t>
+            </a:r>
+            <a:r>
+              <a:rPr lang="en-US" dirty="0"/>
+              <a:t>/brushing-r-squared/</a:t>
+            </a:r>
           </a:p>
         </p:txBody>
       </p:sp>
     </p:spTree>
     <p:extLst>
       <p:ext uri="{BB962C8B-B14F-4D97-AF65-F5344CB8AC3E}">
-        <p14:creationId xmlns:p14="http://schemas.microsoft.com/office/powerpoint/2010/main" val="444141762"/>
+        <p14:creationId xmlns:p14="http://schemas.microsoft.com/office/powerpoint/2010/main" val="10979972"/>
       </p:ext>
     </p:extLst>
   </p:cSld>
@@ -5094,57 +5635,76 @@
           <a:p>
             <a:r>
               <a:rPr lang="en-US" dirty="0" smtClean="0"/>
-              <a:t>Word2Vec Twitter Bot</a:t>
+              <a:t>ROC Curves and AUC</a:t>
             </a:r>
             <a:endParaRPr lang="en-US" dirty="0"/>
           </a:p>
         </p:txBody>
       </p:sp>
-      <p:sp>
-        <p:nvSpPr>
-          <p:cNvPr id="3" name="Content Placeholder 2"/>
-          <p:cNvSpPr>
-            <a:spLocks noGrp="1"/>
-          </p:cNvSpPr>
+      <p:pic>
+        <p:nvPicPr>
+          <p:cNvPr id="4" name="Content Placeholder 3" descr="roc-pretty-good.png"/>
+          <p:cNvPicPr>
+            <a:picLocks noGrp="1" noChangeAspect="1"/>
+          </p:cNvPicPr>
           <p:nvPr>
             <p:ph idx="1"/>
           </p:nvPr>
-        </p:nvSpPr>
-        <p:spPr/>
-        <p:txBody>
-          <a:bodyPr/>
-          <a:lstStyle/>
-          <a:p>
-            <a:r>
-              <a:rPr lang="en-US" dirty="0" smtClean="0"/>
-              <a:t>Pick a body of knowledge to learn (corpus)</a:t>
-            </a:r>
-          </a:p>
-          <a:p>
-            <a:r>
-              <a:rPr lang="en-US" dirty="0" smtClean="0"/>
-              <a:t>Represent that knowledge to the machine</a:t>
-            </a:r>
-          </a:p>
-          <a:p>
-            <a:r>
-              <a:rPr lang="en-US" dirty="0" smtClean="0"/>
-              <a:t>‘One-hot’ representation of knowledge</a:t>
-            </a:r>
-          </a:p>
-          <a:p>
-            <a:r>
-              <a:rPr lang="en-US" dirty="0" smtClean="0"/>
-              <a:t>What does a word vector mean?</a:t>
-            </a:r>
-          </a:p>
-          <a:p>
-            <a:r>
-              <a:rPr lang="en-US" dirty="0" smtClean="0"/>
-              <a:t>The basis for all training: N-Grams</a:t>
-            </a:r>
-          </a:p>
-          <a:p>
+        </p:nvPicPr>
+        <p:blipFill>
+          <a:blip r:embed="rId2">
+            <a:extLst>
+              <a:ext uri="{28A0092B-C50C-407E-A947-70E740481C1C}">
+                <a14:useLocalDpi xmlns:a14="http://schemas.microsoft.com/office/drawing/2010/main" val="0"/>
+              </a:ext>
+            </a:extLst>
+          </a:blip>
+          <a:srcRect l="-18508" r="-18508"/>
+          <a:stretch>
+            <a:fillRect/>
+          </a:stretch>
+        </p:blipFill>
+        <p:spPr/>
+      </p:pic>
+      <p:sp>
+        <p:nvSpPr>
+          <p:cNvPr id="3" name="TextBox 2"/>
+          <p:cNvSpPr txBox="1"/>
+          <p:nvPr/>
+        </p:nvSpPr>
+        <p:spPr>
+          <a:xfrm>
+            <a:off x="1167983" y="6126163"/>
+            <a:ext cx="6985216" cy="369332"/>
+          </a:xfrm>
+          <a:prstGeom prst="rect">
+            <a:avLst/>
+          </a:prstGeom>
+          <a:noFill/>
+        </p:spPr>
+        <p:txBody>
+          <a:bodyPr wrap="square" rtlCol="0">
+            <a:spAutoFit/>
+          </a:bodyPr>
+          <a:lstStyle/>
+          <a:p>
+            <a:pPr algn="ctr"/>
+            <a:r>
+              <a:rPr lang="en-US" dirty="0"/>
+              <a:t>Image source: http://</a:t>
+            </a:r>
+            <a:r>
+              <a:rPr lang="en-US" dirty="0" err="1"/>
+              <a:t>blog.yhathq.com</a:t>
+            </a:r>
+            <a:r>
+              <a:rPr lang="en-US" dirty="0"/>
+              <a:t>/posts/roc-</a:t>
+            </a:r>
+            <a:r>
+              <a:rPr lang="en-US" dirty="0" err="1"/>
+              <a:t>curves.html</a:t>
+            </a:r>
             <a:endParaRPr lang="en-US" dirty="0"/>
           </a:p>
         </p:txBody>
@@ -5152,7 +5712,7 @@
     </p:spTree>
     <p:extLst>
       <p:ext uri="{BB962C8B-B14F-4D97-AF65-F5344CB8AC3E}">
-        <p14:creationId xmlns:p14="http://schemas.microsoft.com/office/powerpoint/2010/main" val="1095052078"/>
+        <p14:creationId xmlns:p14="http://schemas.microsoft.com/office/powerpoint/2010/main" val="3541895907"/>
       </p:ext>
     </p:extLst>
   </p:cSld>
@@ -5203,7 +5763,7 @@
           <a:p>
             <a:r>
               <a:rPr lang="en-US" dirty="0" smtClean="0"/>
-              <a:t>Testing Predictions</a:t>
+              <a:t>Session Two -- Text</a:t>
             </a:r>
             <a:endParaRPr lang="en-US" dirty="0"/>
           </a:p>
@@ -5221,62 +5781,41 @@
         </p:nvSpPr>
         <p:spPr/>
         <p:txBody>
-          <a:bodyPr>
-            <a:normAutofit lnSpcReduction="10000"/>
-          </a:bodyPr>
-          <a:lstStyle/>
-          <a:p>
-            <a:r>
-              <a:rPr lang="en-US" dirty="0" smtClean="0"/>
-              <a:t>How do you know if you something is right?</a:t>
-            </a:r>
-          </a:p>
-          <a:p>
-            <a:r>
-              <a:rPr lang="en-US" dirty="0" smtClean="0"/>
-              <a:t>Especially if you’re a </a:t>
+          <a:bodyPr/>
+          <a:lstStyle/>
+          <a:p>
+            <a:r>
+              <a:rPr lang="en-US" dirty="0" smtClean="0"/>
+              <a:t>Natural Language Processing</a:t>
+            </a:r>
+          </a:p>
+          <a:p>
+            <a:r>
+              <a:rPr lang="en-US" dirty="0" smtClean="0"/>
+              <a:t>Natural Language Generation</a:t>
+            </a:r>
+          </a:p>
+          <a:p>
+            <a:r>
+              <a:rPr lang="en-US" dirty="0" smtClean="0"/>
+              <a:t>Natural Language Understanding (</a:t>
             </a:r>
             <a:r>
               <a:rPr lang="en-US" dirty="0" err="1" smtClean="0"/>
-              <a:t>sceptical</a:t>
-            </a:r>
-            <a:r>
-              <a:rPr lang="en-US" dirty="0" smtClean="0"/>
-              <a:t> person…</a:t>
-            </a:r>
-          </a:p>
-          <a:p>
-            <a:endParaRPr lang="en-US" dirty="0"/>
-          </a:p>
-          <a:p>
-            <a:r>
-              <a:rPr lang="en-US" dirty="0" smtClean="0"/>
-              <a:t>“Seems okay”</a:t>
-            </a:r>
-          </a:p>
-          <a:p>
-            <a:r>
-              <a:rPr lang="en-US" dirty="0" smtClean="0"/>
-              <a:t>Worked on my machine</a:t>
-            </a:r>
-          </a:p>
-          <a:p>
-            <a:r>
-              <a:rPr lang="en-US" dirty="0" smtClean="0"/>
-              <a:t>About as good as a weather forecast</a:t>
-            </a:r>
-          </a:p>
-          <a:p>
-            <a:r>
-              <a:rPr lang="en-US" dirty="0" smtClean="0"/>
-              <a:t>As good as X within Y% likelihood</a:t>
-            </a:r>
-          </a:p>
-          <a:p>
-            <a:r>
-              <a:rPr lang="en-US" dirty="0" smtClean="0"/>
-              <a:t>Accounts for Z% of the error</a:t>
-            </a:r>
+              <a:t>ish</a:t>
+            </a:r>
+            <a:r>
+              <a:rPr lang="en-US" dirty="0" smtClean="0"/>
+              <a:t>)</a:t>
+            </a:r>
+          </a:p>
+          <a:p>
+            <a:r>
+              <a:rPr lang="en-US" dirty="0" smtClean="0"/>
+              <a:t>Markov models, word2vec</a:t>
+            </a:r>
+          </a:p>
+          <a:p>
             <a:endParaRPr lang="en-US" dirty="0"/>
           </a:p>
         </p:txBody>
@@ -5284,7 +5823,7 @@
     </p:spTree>
     <p:extLst>
       <p:ext uri="{BB962C8B-B14F-4D97-AF65-F5344CB8AC3E}">
-        <p14:creationId xmlns:p14="http://schemas.microsoft.com/office/powerpoint/2010/main" val="1645523586"/>
+        <p14:creationId xmlns:p14="http://schemas.microsoft.com/office/powerpoint/2010/main" val="444141762"/>
       </p:ext>
     </p:extLst>
   </p:cSld>
@@ -5335,88 +5874,65 @@
           <a:p>
             <a:r>
               <a:rPr lang="en-US" dirty="0" smtClean="0"/>
-              <a:t>Percent Explained (R2)</a:t>
+              <a:t>Word2Vec Twitter Bot</a:t>
             </a:r>
             <a:endParaRPr lang="en-US" dirty="0"/>
           </a:p>
         </p:txBody>
       </p:sp>
-      <p:pic>
-        <p:nvPicPr>
-          <p:cNvPr id="4" name="Picture 3" descr="r-squared-710x400.png"/>
-          <p:cNvPicPr>
-            <a:picLocks noChangeAspect="1"/>
-          </p:cNvPicPr>
-          <p:nvPr/>
-        </p:nvPicPr>
-        <p:blipFill>
-          <a:blip r:embed="rId2">
-            <a:extLst>
-              <a:ext uri="{28A0092B-C50C-407E-A947-70E740481C1C}">
-                <a14:useLocalDpi xmlns:a14="http://schemas.microsoft.com/office/drawing/2010/main" val="0"/>
-              </a:ext>
-            </a:extLst>
-          </a:blip>
-          <a:stretch>
-            <a:fillRect/>
-          </a:stretch>
-        </p:blipFill>
-        <p:spPr>
-          <a:xfrm>
-            <a:off x="1181100" y="2011630"/>
-            <a:ext cx="6762750" cy="3810000"/>
-          </a:xfrm>
-          <a:prstGeom prst="rect">
-            <a:avLst/>
-          </a:prstGeom>
-        </p:spPr>
-      </p:pic>
-      <p:sp>
-        <p:nvSpPr>
-          <p:cNvPr id="3" name="TextBox 2"/>
-          <p:cNvSpPr txBox="1"/>
-          <p:nvPr/>
-        </p:nvSpPr>
-        <p:spPr>
-          <a:xfrm>
-            <a:off x="1338077" y="6015214"/>
-            <a:ext cx="6735744" cy="369332"/>
-          </a:xfrm>
-          <a:prstGeom prst="rect">
-            <a:avLst/>
-          </a:prstGeom>
-          <a:noFill/>
-        </p:spPr>
-        <p:txBody>
-          <a:bodyPr wrap="square" rtlCol="0">
-            <a:spAutoFit/>
-          </a:bodyPr>
-          <a:lstStyle/>
-          <a:p>
-            <a:pPr algn="ctr"/>
-            <a:r>
-              <a:rPr lang="en-US" dirty="0" smtClean="0"/>
-              <a:t>Source: http</a:t>
-            </a:r>
-            <a:r>
-              <a:rPr lang="en-US" dirty="0"/>
-              <a:t>://</a:t>
-            </a:r>
-            <a:r>
-              <a:rPr lang="en-US" dirty="0" err="1"/>
-              <a:t>www.rapidinsightinc.com</a:t>
-            </a:r>
-            <a:r>
-              <a:rPr lang="en-US" dirty="0"/>
-              <a:t>/brushing-r-squared/</a:t>
-            </a:r>
+      <p:sp>
+        <p:nvSpPr>
+          <p:cNvPr id="3" name="Content Placeholder 2"/>
+          <p:cNvSpPr>
+            <a:spLocks noGrp="1"/>
+          </p:cNvSpPr>
+          <p:nvPr>
+            <p:ph idx="1"/>
+          </p:nvPr>
+        </p:nvSpPr>
+        <p:spPr/>
+        <p:txBody>
+          <a:bodyPr/>
+          <a:lstStyle/>
+          <a:p>
+            <a:r>
+              <a:rPr lang="en-US" dirty="0" smtClean="0"/>
+              <a:t>Pick a body of knowledge to learn (corpus)</a:t>
+            </a:r>
+          </a:p>
+          <a:p>
+            <a:r>
+              <a:rPr lang="en-US" dirty="0" smtClean="0"/>
+              <a:t>Represent that knowledge to the machine</a:t>
+            </a:r>
+          </a:p>
+          <a:p>
+            <a:r>
+              <a:rPr lang="en-US" dirty="0" smtClean="0"/>
+              <a:t>‘One-hot’ representation of knowledge</a:t>
+            </a:r>
+          </a:p>
+          <a:p>
+            <a:r>
+              <a:rPr lang="en-US" dirty="0" smtClean="0"/>
+              <a:t>What does a word vector mean?</a:t>
+            </a:r>
+          </a:p>
+          <a:p>
+            <a:r>
+              <a:rPr lang="en-US" dirty="0" smtClean="0"/>
+              <a:t>The basis for all training: N-Grams</a:t>
+            </a:r>
+          </a:p>
+          <a:p>
+            <a:endParaRPr lang="en-US" dirty="0"/>
           </a:p>
         </p:txBody>
       </p:sp>
     </p:spTree>
     <p:extLst>
       <p:ext uri="{BB962C8B-B14F-4D97-AF65-F5344CB8AC3E}">
-        <p14:creationId xmlns:p14="http://schemas.microsoft.com/office/powerpoint/2010/main" val="10979972"/>
+        <p14:creationId xmlns:p14="http://schemas.microsoft.com/office/powerpoint/2010/main" val="1095052078"/>
       </p:ext>
     </p:extLst>
   </p:cSld>
@@ -5467,75 +5983,86 @@
           <a:p>
             <a:r>
               <a:rPr lang="en-US" dirty="0" smtClean="0"/>
-              <a:t>ROC Curves and AUC</a:t>
+              <a:t>Hands on Example</a:t>
             </a:r>
             <a:endParaRPr lang="en-US" dirty="0"/>
           </a:p>
         </p:txBody>
       </p:sp>
-      <p:pic>
-        <p:nvPicPr>
-          <p:cNvPr id="4" name="Content Placeholder 3" descr="roc-pretty-good.png"/>
-          <p:cNvPicPr>
-            <a:picLocks noGrp="1" noChangeAspect="1"/>
-          </p:cNvPicPr>
+      <p:sp>
+        <p:nvSpPr>
+          <p:cNvPr id="3" name="Content Placeholder 2"/>
+          <p:cNvSpPr>
+            <a:spLocks noGrp="1"/>
+          </p:cNvSpPr>
           <p:nvPr>
             <p:ph idx="1"/>
           </p:nvPr>
-        </p:nvPicPr>
-        <p:blipFill>
-          <a:blip r:embed="rId2">
-            <a:extLst>
-              <a:ext uri="{28A0092B-C50C-407E-A947-70E740481C1C}">
-                <a14:useLocalDpi xmlns:a14="http://schemas.microsoft.com/office/drawing/2010/main" val="0"/>
-              </a:ext>
-            </a:extLst>
-          </a:blip>
-          <a:srcRect l="-18508" r="-18508"/>
-          <a:stretch>
-            <a:fillRect/>
-          </a:stretch>
-        </p:blipFill>
-        <p:spPr/>
-      </p:pic>
-      <p:sp>
-        <p:nvSpPr>
-          <p:cNvPr id="3" name="TextBox 2"/>
-          <p:cNvSpPr txBox="1"/>
-          <p:nvPr/>
-        </p:nvSpPr>
-        <p:spPr>
-          <a:xfrm>
-            <a:off x="1167983" y="6126163"/>
-            <a:ext cx="6985216" cy="369332"/>
-          </a:xfrm>
-          <a:prstGeom prst="rect">
-            <a:avLst/>
-          </a:prstGeom>
-          <a:noFill/>
-        </p:spPr>
-        <p:txBody>
-          <a:bodyPr wrap="square" rtlCol="0">
-            <a:spAutoFit/>
-          </a:bodyPr>
-          <a:lstStyle/>
-          <a:p>
-            <a:pPr algn="ctr"/>
-            <a:r>
-              <a:rPr lang="en-US" dirty="0"/>
-              <a:t>Image source: http://</a:t>
-            </a:r>
-            <a:r>
-              <a:rPr lang="en-US" dirty="0" err="1"/>
-              <a:t>blog.yhathq.com</a:t>
-            </a:r>
-            <a:r>
-              <a:rPr lang="en-US" dirty="0"/>
-              <a:t>/posts/roc-</a:t>
-            </a:r>
-            <a:r>
-              <a:rPr lang="en-US" dirty="0" err="1"/>
-              <a:t>curves.html</a:t>
+        </p:nvSpPr>
+        <p:spPr/>
+        <p:txBody>
+          <a:bodyPr/>
+          <a:lstStyle/>
+          <a:p>
+            <a:r>
+              <a:rPr lang="en-US" dirty="0" smtClean="0"/>
+              <a:t>Look at the ‘</a:t>
+            </a:r>
+            <a:r>
+              <a:rPr lang="en-US" dirty="0" err="1" smtClean="0"/>
+              <a:t>mnist</a:t>
+            </a:r>
+            <a:r>
+              <a:rPr lang="en-US" dirty="0" smtClean="0"/>
+              <a:t>’ directory</a:t>
+            </a:r>
+          </a:p>
+          <a:p>
+            <a:r>
+              <a:rPr lang="en-US" dirty="0" smtClean="0"/>
+              <a:t>Run in this order:</a:t>
+            </a:r>
+          </a:p>
+          <a:p>
+            <a:pPr marL="971550" lvl="1" indent="-514350">
+              <a:buFont typeface="+mj-lt"/>
+              <a:buAutoNum type="arabicPeriod"/>
+            </a:pPr>
+            <a:r>
+              <a:rPr lang="en-US" dirty="0" smtClean="0"/>
+              <a:t>Word2Vec Timing (3m 28s on my machine)</a:t>
+            </a:r>
+          </a:p>
+          <a:p>
+            <a:pPr marL="971550" lvl="1" indent="-514350">
+              <a:buFont typeface="+mj-lt"/>
+              <a:buAutoNum type="arabicPeriod"/>
+            </a:pPr>
+            <a:r>
+              <a:rPr lang="en-US" dirty="0" smtClean="0"/>
+              <a:t>Twitter </a:t>
+            </a:r>
+            <a:r>
+              <a:rPr lang="en-US" dirty="0" err="1" smtClean="0"/>
+              <a:t>Chatbot</a:t>
+            </a:r>
+            <a:r>
+              <a:rPr lang="en-US" dirty="0" smtClean="0"/>
+              <a:t> (silly demo)</a:t>
+            </a:r>
+          </a:p>
+          <a:p>
+            <a:pPr marL="971550" lvl="1" indent="-514350">
+              <a:buFont typeface="+mj-lt"/>
+              <a:buAutoNum type="arabicPeriod"/>
+            </a:pPr>
+            <a:r>
+              <a:rPr lang="en-US" dirty="0" smtClean="0"/>
+              <a:t>Word2Vec (for </a:t>
+            </a:r>
+            <a:r>
+              <a:rPr lang="en-US" smtClean="0"/>
+              <a:t>exploring the API)</a:t>
             </a:r>
             <a:endParaRPr lang="en-US" dirty="0"/>
           </a:p>
@@ -5544,20 +6071,13 @@
     </p:spTree>
     <p:extLst>
       <p:ext uri="{BB962C8B-B14F-4D97-AF65-F5344CB8AC3E}">
-        <p14:creationId xmlns:p14="http://schemas.microsoft.com/office/powerpoint/2010/main" val="3541895907"/>
+        <p14:creationId xmlns:p14="http://schemas.microsoft.com/office/powerpoint/2010/main" val="931099249"/>
       </p:ext>
     </p:extLst>
   </p:cSld>
   <p:clrMapOvr>
     <a:masterClrMapping/>
   </p:clrMapOvr>
-  <p:timing>
-    <p:tnLst>
-      <p:par>
-        <p:cTn xmlns:p14="http://schemas.microsoft.com/office/powerpoint/2010/main" id="1" dur="indefinite" restart="never" nodeType="tmRoot"/>
-      </p:par>
-    </p:tnLst>
-  </p:timing>
 </p:sld>
 </file>
 
@@ -5636,11 +6156,7 @@
           <a:p>
             <a:r>
               <a:rPr lang="en-US" dirty="0" smtClean="0"/>
-              <a:t>Time </a:t>
-            </a:r>
-            <a:r>
-              <a:rPr lang="en-US" dirty="0" smtClean="0"/>
-              <a:t>Views</a:t>
+              <a:t>Time Views</a:t>
             </a:r>
           </a:p>
           <a:p>
@@ -7017,11 +7533,7 @@
           <a:p>
             <a:r>
               <a:rPr lang="en-US" sz="2000" dirty="0" smtClean="0"/>
-              <a:t>	</a:t>
-            </a:r>
-            <a:r>
-              <a:rPr lang="en-US" sz="2000" dirty="0" smtClean="0"/>
-              <a:t>./</a:t>
+              <a:t>	./</a:t>
             </a:r>
             <a:r>
               <a:rPr lang="en-US" sz="2000" dirty="0" err="1" smtClean="0"/>
@@ -8167,4 +8679,324 @@
   </a:objectDefaults>
   <a:extraClrSchemeLst/>
 </a:theme>
+</file>
+
+<file path=ppt/theme/theme2.xml><?xml version="1.0" encoding="utf-8"?>
+<a:theme xmlns:a="http://schemas.openxmlformats.org/drawingml/2006/main" name="Office Theme">
+  <a:themeElements>
+    <a:clrScheme name="Office">
+      <a:dk1>
+        <a:sysClr val="windowText" lastClr="000000"/>
+      </a:dk1>
+      <a:lt1>
+        <a:sysClr val="window" lastClr="FFFFFF"/>
+      </a:lt1>
+      <a:dk2>
+        <a:srgbClr val="1F497D"/>
+      </a:dk2>
+      <a:lt2>
+        <a:srgbClr val="EEECE1"/>
+      </a:lt2>
+      <a:accent1>
+        <a:srgbClr val="4F81BD"/>
+      </a:accent1>
+      <a:accent2>
+        <a:srgbClr val="C0504D"/>
+      </a:accent2>
+      <a:accent3>
+        <a:srgbClr val="9BBB59"/>
+      </a:accent3>
+      <a:accent4>
+        <a:srgbClr val="8064A2"/>
+      </a:accent4>
+      <a:accent5>
+        <a:srgbClr val="4BACC6"/>
+      </a:accent5>
+      <a:accent6>
+        <a:srgbClr val="F79646"/>
+      </a:accent6>
+      <a:hlink>
+        <a:srgbClr val="0000FF"/>
+      </a:hlink>
+      <a:folHlink>
+        <a:srgbClr val="800080"/>
+      </a:folHlink>
+    </a:clrScheme>
+    <a:fontScheme name="Office">
+      <a:majorFont>
+        <a:latin typeface="Calibri"/>
+        <a:ea typeface=""/>
+        <a:cs typeface=""/>
+        <a:font script="Jpan" typeface="ＭＳ Ｐゴシック"/>
+        <a:font script="Hang" typeface="맑은 고딕"/>
+        <a:font script="Hans" typeface="宋体"/>
+        <a:font script="Hant" typeface="新細明體"/>
+        <a:font script="Arab" typeface="Times New Roman"/>
+        <a:font script="Hebr" typeface="Times New Roman"/>
+        <a:font script="Thai" typeface="Angsana New"/>
+        <a:font script="Ethi" typeface="Nyala"/>
+        <a:font script="Beng" typeface="Vrinda"/>
+        <a:font script="Gujr" typeface="Shruti"/>
+        <a:font script="Khmr" typeface="MoolBoran"/>
+        <a:font script="Knda" typeface="Tunga"/>
+        <a:font script="Guru" typeface="Raavi"/>
+        <a:font script="Cans" typeface="Euphemia"/>
+        <a:font script="Cher" typeface="Plantagenet Cherokee"/>
+        <a:font script="Yiii" typeface="Microsoft Yi Baiti"/>
+        <a:font script="Tibt" typeface="Microsoft Himalaya"/>
+        <a:font script="Thaa" typeface="MV Boli"/>
+        <a:font script="Deva" typeface="Mangal"/>
+        <a:font script="Telu" typeface="Gautami"/>
+        <a:font script="Taml" typeface="Latha"/>
+        <a:font script="Syrc" typeface="Estrangelo Edessa"/>
+        <a:font script="Orya" typeface="Kalinga"/>
+        <a:font script="Mlym" typeface="Kartika"/>
+        <a:font script="Laoo" typeface="DokChampa"/>
+        <a:font script="Sinh" typeface="Iskoola Pota"/>
+        <a:font script="Mong" typeface="Mongolian Baiti"/>
+        <a:font script="Viet" typeface="Times New Roman"/>
+        <a:font script="Uigh" typeface="Microsoft Uighur"/>
+        <a:font script="Geor" typeface="Sylfaen"/>
+      </a:majorFont>
+      <a:minorFont>
+        <a:latin typeface="Calibri"/>
+        <a:ea typeface=""/>
+        <a:cs typeface=""/>
+        <a:font script="Jpan" typeface="ＭＳ Ｐゴシック"/>
+        <a:font script="Hang" typeface="맑은 고딕"/>
+        <a:font script="Hans" typeface="宋体"/>
+        <a:font script="Hant" typeface="新細明體"/>
+        <a:font script="Arab" typeface="Arial"/>
+        <a:font script="Hebr" typeface="Arial"/>
+        <a:font script="Thai" typeface="Cordia New"/>
+        <a:font script="Ethi" typeface="Nyala"/>
+        <a:font script="Beng" typeface="Vrinda"/>
+        <a:font script="Gujr" typeface="Shruti"/>
+        <a:font script="Khmr" typeface="DaunPenh"/>
+        <a:font script="Knda" typeface="Tunga"/>
+        <a:font script="Guru" typeface="Raavi"/>
+        <a:font script="Cans" typeface="Euphemia"/>
+        <a:font script="Cher" typeface="Plantagenet Cherokee"/>
+        <a:font script="Yiii" typeface="Microsoft Yi Baiti"/>
+        <a:font script="Tibt" typeface="Microsoft Himalaya"/>
+        <a:font script="Thaa" typeface="MV Boli"/>
+        <a:font script="Deva" typeface="Mangal"/>
+        <a:font script="Telu" typeface="Gautami"/>
+        <a:font script="Taml" typeface="Latha"/>
+        <a:font script="Syrc" typeface="Estrangelo Edessa"/>
+        <a:font script="Orya" typeface="Kalinga"/>
+        <a:font script="Mlym" typeface="Kartika"/>
+        <a:font script="Laoo" typeface="DokChampa"/>
+        <a:font script="Sinh" typeface="Iskoola Pota"/>
+        <a:font script="Mong" typeface="Mongolian Baiti"/>
+        <a:font script="Viet" typeface="Arial"/>
+        <a:font script="Uigh" typeface="Microsoft Uighur"/>
+        <a:font script="Geor" typeface="Sylfaen"/>
+      </a:minorFont>
+    </a:fontScheme>
+    <a:fmtScheme name="Office">
+      <a:fillStyleLst>
+        <a:solidFill>
+          <a:schemeClr val="phClr"/>
+        </a:solidFill>
+        <a:gradFill rotWithShape="1">
+          <a:gsLst>
+            <a:gs pos="0">
+              <a:schemeClr val="phClr">
+                <a:tint val="50000"/>
+                <a:satMod val="300000"/>
+              </a:schemeClr>
+            </a:gs>
+            <a:gs pos="35000">
+              <a:schemeClr val="phClr">
+                <a:tint val="37000"/>
+                <a:satMod val="300000"/>
+              </a:schemeClr>
+            </a:gs>
+            <a:gs pos="100000">
+              <a:schemeClr val="phClr">
+                <a:tint val="15000"/>
+                <a:satMod val="350000"/>
+              </a:schemeClr>
+            </a:gs>
+          </a:gsLst>
+          <a:lin ang="16200000" scaled="1"/>
+        </a:gradFill>
+        <a:gradFill rotWithShape="1">
+          <a:gsLst>
+            <a:gs pos="0">
+              <a:schemeClr val="phClr">
+                <a:tint val="100000"/>
+                <a:shade val="100000"/>
+                <a:satMod val="130000"/>
+              </a:schemeClr>
+            </a:gs>
+            <a:gs pos="100000">
+              <a:schemeClr val="phClr">
+                <a:tint val="50000"/>
+                <a:shade val="100000"/>
+                <a:satMod val="350000"/>
+              </a:schemeClr>
+            </a:gs>
+          </a:gsLst>
+          <a:lin ang="16200000" scaled="0"/>
+        </a:gradFill>
+      </a:fillStyleLst>
+      <a:lnStyleLst>
+        <a:ln w="9525" cap="flat" cmpd="sng" algn="ctr">
+          <a:solidFill>
+            <a:schemeClr val="phClr">
+              <a:shade val="95000"/>
+              <a:satMod val="105000"/>
+            </a:schemeClr>
+          </a:solidFill>
+          <a:prstDash val="solid"/>
+        </a:ln>
+        <a:ln w="25400" cap="flat" cmpd="sng" algn="ctr">
+          <a:solidFill>
+            <a:schemeClr val="phClr"/>
+          </a:solidFill>
+          <a:prstDash val="solid"/>
+        </a:ln>
+        <a:ln w="38100" cap="flat" cmpd="sng" algn="ctr">
+          <a:solidFill>
+            <a:schemeClr val="phClr"/>
+          </a:solidFill>
+          <a:prstDash val="solid"/>
+        </a:ln>
+      </a:lnStyleLst>
+      <a:effectStyleLst>
+        <a:effectStyle>
+          <a:effectLst>
+            <a:outerShdw blurRad="40000" dist="20000" dir="5400000" rotWithShape="0">
+              <a:srgbClr val="000000">
+                <a:alpha val="38000"/>
+              </a:srgbClr>
+            </a:outerShdw>
+          </a:effectLst>
+        </a:effectStyle>
+        <a:effectStyle>
+          <a:effectLst>
+            <a:outerShdw blurRad="40000" dist="23000" dir="5400000" rotWithShape="0">
+              <a:srgbClr val="000000">
+                <a:alpha val="35000"/>
+              </a:srgbClr>
+            </a:outerShdw>
+          </a:effectLst>
+        </a:effectStyle>
+        <a:effectStyle>
+          <a:effectLst>
+            <a:outerShdw blurRad="40000" dist="23000" dir="5400000" rotWithShape="0">
+              <a:srgbClr val="000000">
+                <a:alpha val="35000"/>
+              </a:srgbClr>
+            </a:outerShdw>
+          </a:effectLst>
+          <a:scene3d>
+            <a:camera prst="orthographicFront">
+              <a:rot lat="0" lon="0" rev="0"/>
+            </a:camera>
+            <a:lightRig rig="threePt" dir="t">
+              <a:rot lat="0" lon="0" rev="1200000"/>
+            </a:lightRig>
+          </a:scene3d>
+          <a:sp3d>
+            <a:bevelT w="63500" h="25400"/>
+          </a:sp3d>
+        </a:effectStyle>
+      </a:effectStyleLst>
+      <a:bgFillStyleLst>
+        <a:solidFill>
+          <a:schemeClr val="phClr"/>
+        </a:solidFill>
+        <a:gradFill rotWithShape="1">
+          <a:gsLst>
+            <a:gs pos="0">
+              <a:schemeClr val="phClr">
+                <a:tint val="40000"/>
+                <a:satMod val="350000"/>
+              </a:schemeClr>
+            </a:gs>
+            <a:gs pos="40000">
+              <a:schemeClr val="phClr">
+                <a:tint val="45000"/>
+                <a:shade val="99000"/>
+                <a:satMod val="350000"/>
+              </a:schemeClr>
+            </a:gs>
+            <a:gs pos="100000">
+              <a:schemeClr val="phClr">
+                <a:shade val="20000"/>
+                <a:satMod val="255000"/>
+              </a:schemeClr>
+            </a:gs>
+          </a:gsLst>
+          <a:path path="circle">
+            <a:fillToRect l="50000" t="-80000" r="50000" b="180000"/>
+          </a:path>
+        </a:gradFill>
+        <a:gradFill rotWithShape="1">
+          <a:gsLst>
+            <a:gs pos="0">
+              <a:schemeClr val="phClr">
+                <a:tint val="80000"/>
+                <a:satMod val="300000"/>
+              </a:schemeClr>
+            </a:gs>
+            <a:gs pos="100000">
+              <a:schemeClr val="phClr">
+                <a:shade val="30000"/>
+                <a:satMod val="200000"/>
+              </a:schemeClr>
+            </a:gs>
+          </a:gsLst>
+          <a:path path="circle">
+            <a:fillToRect l="50000" t="50000" r="50000" b="50000"/>
+          </a:path>
+        </a:gradFill>
+      </a:bgFillStyleLst>
+    </a:fmtScheme>
+  </a:themeElements>
+  <a:objectDefaults>
+    <a:spDef>
+      <a:spPr/>
+      <a:bodyPr/>
+      <a:lstStyle/>
+      <a:style>
+        <a:lnRef idx="1">
+          <a:schemeClr val="accent1"/>
+        </a:lnRef>
+        <a:fillRef idx="3">
+          <a:schemeClr val="accent1"/>
+        </a:fillRef>
+        <a:effectRef idx="2">
+          <a:schemeClr val="accent1"/>
+        </a:effectRef>
+        <a:fontRef idx="minor">
+          <a:schemeClr val="lt1"/>
+        </a:fontRef>
+      </a:style>
+    </a:spDef>
+    <a:lnDef>
+      <a:spPr/>
+      <a:bodyPr/>
+      <a:lstStyle/>
+      <a:style>
+        <a:lnRef idx="2">
+          <a:schemeClr val="accent1"/>
+        </a:lnRef>
+        <a:fillRef idx="0">
+          <a:schemeClr val="accent1"/>
+        </a:fillRef>
+        <a:effectRef idx="1">
+          <a:schemeClr val="accent1"/>
+        </a:effectRef>
+        <a:fontRef idx="minor">
+          <a:schemeClr val="tx1"/>
+        </a:fontRef>
+      </a:style>
+    </a:lnDef>
+  </a:objectDefaults>
+  <a:extraClrSchemeLst/>
+</a:theme>
 </file>
</xml_diff>